<commit_message>
added new sim diagram with states numbered
</commit_message>
<xml_diff>
--- a/figures/simulation_model_diagram.pptx
+++ b/figures/simulation_model_diagram.pptx
@@ -259,7 +259,7 @@
           <a:p>
             <a:fld id="{5CB7705F-197A-364B-B966-A3D2D808BF85}" type="datetimeFigureOut">
               <a:rPr lang="en-US" smtClean="0"/>
-              <a:t>4/12/22</a:t>
+              <a:t>5/17/22</a:t>
             </a:fld>
             <a:endParaRPr lang="en-US"/>
           </a:p>
@@ -457,7 +457,7 @@
           <a:p>
             <a:fld id="{5CB7705F-197A-364B-B966-A3D2D808BF85}" type="datetimeFigureOut">
               <a:rPr lang="en-US" smtClean="0"/>
-              <a:t>4/12/22</a:t>
+              <a:t>5/17/22</a:t>
             </a:fld>
             <a:endParaRPr lang="en-US"/>
           </a:p>
@@ -665,7 +665,7 @@
           <a:p>
             <a:fld id="{5CB7705F-197A-364B-B966-A3D2D808BF85}" type="datetimeFigureOut">
               <a:rPr lang="en-US" smtClean="0"/>
-              <a:t>4/12/22</a:t>
+              <a:t>5/17/22</a:t>
             </a:fld>
             <a:endParaRPr lang="en-US"/>
           </a:p>
@@ -863,7 +863,7 @@
           <a:p>
             <a:fld id="{5CB7705F-197A-364B-B966-A3D2D808BF85}" type="datetimeFigureOut">
               <a:rPr lang="en-US" smtClean="0"/>
-              <a:t>4/12/22</a:t>
+              <a:t>5/17/22</a:t>
             </a:fld>
             <a:endParaRPr lang="en-US"/>
           </a:p>
@@ -1138,7 +1138,7 @@
           <a:p>
             <a:fld id="{5CB7705F-197A-364B-B966-A3D2D808BF85}" type="datetimeFigureOut">
               <a:rPr lang="en-US" smtClean="0"/>
-              <a:t>4/12/22</a:t>
+              <a:t>5/17/22</a:t>
             </a:fld>
             <a:endParaRPr lang="en-US"/>
           </a:p>
@@ -1403,7 +1403,7 @@
           <a:p>
             <a:fld id="{5CB7705F-197A-364B-B966-A3D2D808BF85}" type="datetimeFigureOut">
               <a:rPr lang="en-US" smtClean="0"/>
-              <a:t>4/12/22</a:t>
+              <a:t>5/17/22</a:t>
             </a:fld>
             <a:endParaRPr lang="en-US"/>
           </a:p>
@@ -1815,7 +1815,7 @@
           <a:p>
             <a:fld id="{5CB7705F-197A-364B-B966-A3D2D808BF85}" type="datetimeFigureOut">
               <a:rPr lang="en-US" smtClean="0"/>
-              <a:t>4/12/22</a:t>
+              <a:t>5/17/22</a:t>
             </a:fld>
             <a:endParaRPr lang="en-US"/>
           </a:p>
@@ -1956,7 +1956,7 @@
           <a:p>
             <a:fld id="{5CB7705F-197A-364B-B966-A3D2D808BF85}" type="datetimeFigureOut">
               <a:rPr lang="en-US" smtClean="0"/>
-              <a:t>4/12/22</a:t>
+              <a:t>5/17/22</a:t>
             </a:fld>
             <a:endParaRPr lang="en-US"/>
           </a:p>
@@ -2069,7 +2069,7 @@
           <a:p>
             <a:fld id="{5CB7705F-197A-364B-B966-A3D2D808BF85}" type="datetimeFigureOut">
               <a:rPr lang="en-US" smtClean="0"/>
-              <a:t>4/12/22</a:t>
+              <a:t>5/17/22</a:t>
             </a:fld>
             <a:endParaRPr lang="en-US"/>
           </a:p>
@@ -2380,7 +2380,7 @@
           <a:p>
             <a:fld id="{5CB7705F-197A-364B-B966-A3D2D808BF85}" type="datetimeFigureOut">
               <a:rPr lang="en-US" smtClean="0"/>
-              <a:t>4/12/22</a:t>
+              <a:t>5/17/22</a:t>
             </a:fld>
             <a:endParaRPr lang="en-US"/>
           </a:p>
@@ -2668,7 +2668,7 @@
           <a:p>
             <a:fld id="{5CB7705F-197A-364B-B966-A3D2D808BF85}" type="datetimeFigureOut">
               <a:rPr lang="en-US" smtClean="0"/>
-              <a:t>4/12/22</a:t>
+              <a:t>5/17/22</a:t>
             </a:fld>
             <a:endParaRPr lang="en-US"/>
           </a:p>
@@ -2909,7 +2909,7 @@
           <a:p>
             <a:fld id="{5CB7705F-197A-364B-B966-A3D2D808BF85}" type="datetimeFigureOut">
               <a:rPr lang="en-US" smtClean="0"/>
-              <a:t>4/12/22</a:t>
+              <a:t>5/17/22</a:t>
             </a:fld>
             <a:endParaRPr lang="en-US"/>
           </a:p>
@@ -6332,6 +6332,348 @@
           </p:txBody>
         </p:sp>
       </p:grpSp>
+      <p:sp>
+        <p:nvSpPr>
+          <p:cNvPr id="72" name="TextBox 71">
+            <a:extLst>
+              <a:ext uri="{FF2B5EF4-FFF2-40B4-BE49-F238E27FC236}">
+                <a16:creationId xmlns:a16="http://schemas.microsoft.com/office/drawing/2014/main" id="{CDA4EC80-1B68-FC42-B745-3D361163F837}"/>
+              </a:ext>
+            </a:extLst>
+          </p:cNvPr>
+          <p:cNvSpPr txBox="1"/>
+          <p:nvPr/>
+        </p:nvSpPr>
+        <p:spPr>
+          <a:xfrm>
+            <a:off x="-34895" y="2547319"/>
+            <a:ext cx="1989181" cy="523220"/>
+          </a:xfrm>
+          <a:prstGeom prst="rect">
+            <a:avLst/>
+          </a:prstGeom>
+          <a:noFill/>
+        </p:spPr>
+        <p:txBody>
+          <a:bodyPr wrap="square" rtlCol="0">
+            <a:spAutoFit/>
+          </a:bodyPr>
+          <a:lstStyle/>
+          <a:p>
+            <a:pPr algn="ctr"/>
+            <a:r>
+              <a:rPr lang="en-US" sz="2800" dirty="0">
+                <a:latin typeface="Helvetica" pitchFamily="2" charset="0"/>
+              </a:rPr>
+              <a:t>1</a:t>
+            </a:r>
+          </a:p>
+        </p:txBody>
+      </p:sp>
+      <p:sp>
+        <p:nvSpPr>
+          <p:cNvPr id="73" name="TextBox 72">
+            <a:extLst>
+              <a:ext uri="{FF2B5EF4-FFF2-40B4-BE49-F238E27FC236}">
+                <a16:creationId xmlns:a16="http://schemas.microsoft.com/office/drawing/2014/main" id="{A2A22249-0CC1-7A42-9DF5-EDE9EB45ED77}"/>
+              </a:ext>
+            </a:extLst>
+          </p:cNvPr>
+          <p:cNvSpPr txBox="1"/>
+          <p:nvPr/>
+        </p:nvSpPr>
+        <p:spPr>
+          <a:xfrm>
+            <a:off x="2818334" y="2526991"/>
+            <a:ext cx="1989181" cy="523220"/>
+          </a:xfrm>
+          <a:prstGeom prst="rect">
+            <a:avLst/>
+          </a:prstGeom>
+          <a:noFill/>
+        </p:spPr>
+        <p:txBody>
+          <a:bodyPr wrap="square" rtlCol="0">
+            <a:spAutoFit/>
+          </a:bodyPr>
+          <a:lstStyle/>
+          <a:p>
+            <a:pPr algn="ctr"/>
+            <a:r>
+              <a:rPr lang="en-US" sz="2800" dirty="0">
+                <a:latin typeface="Helvetica" pitchFamily="2" charset="0"/>
+              </a:rPr>
+              <a:t>2</a:t>
+            </a:r>
+          </a:p>
+        </p:txBody>
+      </p:sp>
+      <p:sp>
+        <p:nvSpPr>
+          <p:cNvPr id="75" name="TextBox 74">
+            <a:extLst>
+              <a:ext uri="{FF2B5EF4-FFF2-40B4-BE49-F238E27FC236}">
+                <a16:creationId xmlns:a16="http://schemas.microsoft.com/office/drawing/2014/main" id="{9CBC99BB-444B-0E47-9EAF-22F7820875E1}"/>
+              </a:ext>
+            </a:extLst>
+          </p:cNvPr>
+          <p:cNvSpPr txBox="1"/>
+          <p:nvPr/>
+        </p:nvSpPr>
+        <p:spPr>
+          <a:xfrm>
+            <a:off x="5800005" y="2508105"/>
+            <a:ext cx="1989181" cy="523220"/>
+          </a:xfrm>
+          <a:prstGeom prst="rect">
+            <a:avLst/>
+          </a:prstGeom>
+          <a:noFill/>
+        </p:spPr>
+        <p:txBody>
+          <a:bodyPr wrap="square" rtlCol="0">
+            <a:spAutoFit/>
+          </a:bodyPr>
+          <a:lstStyle/>
+          <a:p>
+            <a:pPr algn="ctr"/>
+            <a:r>
+              <a:rPr lang="en-US" sz="2800" dirty="0">
+                <a:latin typeface="Helvetica" pitchFamily="2" charset="0"/>
+              </a:rPr>
+              <a:t>3</a:t>
+            </a:r>
+          </a:p>
+        </p:txBody>
+      </p:sp>
+      <p:sp>
+        <p:nvSpPr>
+          <p:cNvPr id="76" name="TextBox 75">
+            <a:extLst>
+              <a:ext uri="{FF2B5EF4-FFF2-40B4-BE49-F238E27FC236}">
+                <a16:creationId xmlns:a16="http://schemas.microsoft.com/office/drawing/2014/main" id="{041AC36A-38B0-EB4A-AA5C-B81A9CDFD492}"/>
+              </a:ext>
+            </a:extLst>
+          </p:cNvPr>
+          <p:cNvSpPr txBox="1"/>
+          <p:nvPr/>
+        </p:nvSpPr>
+        <p:spPr>
+          <a:xfrm>
+            <a:off x="8556911" y="551648"/>
+            <a:ext cx="1989181" cy="523220"/>
+          </a:xfrm>
+          <a:prstGeom prst="rect">
+            <a:avLst/>
+          </a:prstGeom>
+          <a:noFill/>
+        </p:spPr>
+        <p:txBody>
+          <a:bodyPr wrap="square" rtlCol="0">
+            <a:spAutoFit/>
+          </a:bodyPr>
+          <a:lstStyle/>
+          <a:p>
+            <a:pPr algn="ctr"/>
+            <a:r>
+              <a:rPr lang="en-US" sz="2800" dirty="0">
+                <a:latin typeface="Helvetica" pitchFamily="2" charset="0"/>
+              </a:rPr>
+              <a:t>4</a:t>
+            </a:r>
+          </a:p>
+        </p:txBody>
+      </p:sp>
+      <p:sp>
+        <p:nvSpPr>
+          <p:cNvPr id="77" name="TextBox 76">
+            <a:extLst>
+              <a:ext uri="{FF2B5EF4-FFF2-40B4-BE49-F238E27FC236}">
+                <a16:creationId xmlns:a16="http://schemas.microsoft.com/office/drawing/2014/main" id="{2A172073-7C21-A945-A190-042F9AD1A1BC}"/>
+              </a:ext>
+            </a:extLst>
+          </p:cNvPr>
+          <p:cNvSpPr txBox="1"/>
+          <p:nvPr/>
+        </p:nvSpPr>
+        <p:spPr>
+          <a:xfrm>
+            <a:off x="8573016" y="4536779"/>
+            <a:ext cx="1989181" cy="523220"/>
+          </a:xfrm>
+          <a:prstGeom prst="rect">
+            <a:avLst/>
+          </a:prstGeom>
+          <a:noFill/>
+        </p:spPr>
+        <p:txBody>
+          <a:bodyPr wrap="square" rtlCol="0">
+            <a:spAutoFit/>
+          </a:bodyPr>
+          <a:lstStyle/>
+          <a:p>
+            <a:pPr algn="ctr"/>
+            <a:r>
+              <a:rPr lang="en-US" sz="2800" dirty="0">
+                <a:latin typeface="Helvetica" pitchFamily="2" charset="0"/>
+              </a:rPr>
+              <a:t>5</a:t>
+            </a:r>
+          </a:p>
+        </p:txBody>
+      </p:sp>
+      <p:sp>
+        <p:nvSpPr>
+          <p:cNvPr id="79" name="TextBox 78">
+            <a:extLst>
+              <a:ext uri="{FF2B5EF4-FFF2-40B4-BE49-F238E27FC236}">
+                <a16:creationId xmlns:a16="http://schemas.microsoft.com/office/drawing/2014/main" id="{4D18A89D-E4C3-A444-A440-A21B0FC1A5D0}"/>
+              </a:ext>
+            </a:extLst>
+          </p:cNvPr>
+          <p:cNvSpPr txBox="1"/>
+          <p:nvPr/>
+        </p:nvSpPr>
+        <p:spPr>
+          <a:xfrm>
+            <a:off x="10473403" y="3320618"/>
+            <a:ext cx="1989181" cy="523220"/>
+          </a:xfrm>
+          <a:prstGeom prst="rect">
+            <a:avLst/>
+          </a:prstGeom>
+          <a:noFill/>
+        </p:spPr>
+        <p:txBody>
+          <a:bodyPr wrap="square" rtlCol="0">
+            <a:spAutoFit/>
+          </a:bodyPr>
+          <a:lstStyle/>
+          <a:p>
+            <a:pPr algn="ctr"/>
+            <a:r>
+              <a:rPr lang="en-US" sz="2800" dirty="0">
+                <a:latin typeface="Helvetica" pitchFamily="2" charset="0"/>
+              </a:rPr>
+              <a:t>8</a:t>
+            </a:r>
+          </a:p>
+        </p:txBody>
+      </p:sp>
+      <p:sp>
+        <p:nvSpPr>
+          <p:cNvPr id="80" name="TextBox 79">
+            <a:extLst>
+              <a:ext uri="{FF2B5EF4-FFF2-40B4-BE49-F238E27FC236}">
+                <a16:creationId xmlns:a16="http://schemas.microsoft.com/office/drawing/2014/main" id="{BB151AFE-B896-8B43-B1F0-F78747239027}"/>
+              </a:ext>
+            </a:extLst>
+          </p:cNvPr>
+          <p:cNvSpPr txBox="1"/>
+          <p:nvPr/>
+        </p:nvSpPr>
+        <p:spPr>
+          <a:xfrm>
+            <a:off x="5784577" y="607431"/>
+            <a:ext cx="1989181" cy="523220"/>
+          </a:xfrm>
+          <a:prstGeom prst="rect">
+            <a:avLst/>
+          </a:prstGeom>
+          <a:noFill/>
+        </p:spPr>
+        <p:txBody>
+          <a:bodyPr wrap="square" rtlCol="0">
+            <a:spAutoFit/>
+          </a:bodyPr>
+          <a:lstStyle/>
+          <a:p>
+            <a:pPr algn="ctr"/>
+            <a:r>
+              <a:rPr lang="en-US" sz="2800" dirty="0">
+                <a:latin typeface="Helvetica" pitchFamily="2" charset="0"/>
+              </a:rPr>
+              <a:t>9</a:t>
+            </a:r>
+          </a:p>
+        </p:txBody>
+      </p:sp>
+      <p:sp>
+        <p:nvSpPr>
+          <p:cNvPr id="81" name="TextBox 80">
+            <a:extLst>
+              <a:ext uri="{FF2B5EF4-FFF2-40B4-BE49-F238E27FC236}">
+                <a16:creationId xmlns:a16="http://schemas.microsoft.com/office/drawing/2014/main" id="{82E95539-EFB0-4D42-9FF8-7C2A82E1548D}"/>
+              </a:ext>
+            </a:extLst>
+          </p:cNvPr>
+          <p:cNvSpPr txBox="1"/>
+          <p:nvPr/>
+        </p:nvSpPr>
+        <p:spPr>
+          <a:xfrm>
+            <a:off x="3857850" y="580477"/>
+            <a:ext cx="1989181" cy="523220"/>
+          </a:xfrm>
+          <a:prstGeom prst="rect">
+            <a:avLst/>
+          </a:prstGeom>
+          <a:noFill/>
+        </p:spPr>
+        <p:txBody>
+          <a:bodyPr wrap="square" rtlCol="0">
+            <a:spAutoFit/>
+          </a:bodyPr>
+          <a:lstStyle/>
+          <a:p>
+            <a:pPr algn="ctr"/>
+            <a:r>
+              <a:rPr lang="en-US" sz="2800" dirty="0">
+                <a:latin typeface="Helvetica" pitchFamily="2" charset="0"/>
+              </a:rPr>
+              <a:t>7</a:t>
+            </a:r>
+          </a:p>
+        </p:txBody>
+      </p:sp>
+      <p:sp>
+        <p:nvSpPr>
+          <p:cNvPr id="83" name="TextBox 82">
+            <a:extLst>
+              <a:ext uri="{FF2B5EF4-FFF2-40B4-BE49-F238E27FC236}">
+                <a16:creationId xmlns:a16="http://schemas.microsoft.com/office/drawing/2014/main" id="{0715DF3E-CBC9-5F4E-B383-61286E40C630}"/>
+              </a:ext>
+            </a:extLst>
+          </p:cNvPr>
+          <p:cNvSpPr txBox="1"/>
+          <p:nvPr/>
+        </p:nvSpPr>
+        <p:spPr>
+          <a:xfrm>
+            <a:off x="1786405" y="607431"/>
+            <a:ext cx="1989181" cy="523220"/>
+          </a:xfrm>
+          <a:prstGeom prst="rect">
+            <a:avLst/>
+          </a:prstGeom>
+          <a:noFill/>
+        </p:spPr>
+        <p:txBody>
+          <a:bodyPr wrap="square" rtlCol="0">
+            <a:spAutoFit/>
+          </a:bodyPr>
+          <a:lstStyle/>
+          <a:p>
+            <a:pPr algn="ctr"/>
+            <a:r>
+              <a:rPr lang="en-US" sz="2800" dirty="0">
+                <a:latin typeface="Helvetica" pitchFamily="2" charset="0"/>
+              </a:rPr>
+              <a:t>6</a:t>
+            </a:r>
+          </a:p>
+        </p:txBody>
+      </p:sp>
     </p:spTree>
     <p:extLst>
       <p:ext uri="{BB962C8B-B14F-4D97-AF65-F5344CB8AC3E}">

</xml_diff>